<commit_message>
Update manual and added exercise of module 3 exercise 2
</commit_message>
<xml_diff>
--- a/Presentacion/Curso Sql Basico.pptx
+++ b/Presentacion/Curso Sql Basico.pptx
@@ -263,7 +263,7 @@
           <a:p>
             <a:fld id="{59041DB8-B66F-4DC8-A96E-33677E0F90FF}" type="datetimeFigureOut">
               <a:rPr lang="en-US" smtClean="0"/>
-              <a:t>6/5/2017</a:t>
+              <a:t>6/6/2017</a:t>
             </a:fld>
             <a:endParaRPr lang="en-US"/>
           </a:p>
@@ -428,7 +428,7 @@
           <a:p>
             <a:fld id="{DEB49C4A-65AC-492D-9701-81B46C3AD0E4}" type="datetimeFigureOut">
               <a:rPr lang="en-US" smtClean="0"/>
-              <a:t>6/5/2017</a:t>
+              <a:t>6/6/2017</a:t>
             </a:fld>
             <a:endParaRPr lang="en-US"/>
           </a:p>
@@ -7376,7 +7376,7 @@
           <a:p>
             <a:fld id="{384A29A4-78C8-47AB-BA06-22CB45938951}" type="datetime1">
               <a:rPr lang="en-US" smtClean="0"/>
-              <a:t>6/5/2017</a:t>
+              <a:t>6/6/2017</a:t>
             </a:fld>
             <a:endParaRPr lang="en-US"/>
           </a:p>
@@ -7568,7 +7568,7 @@
           <a:p>
             <a:fld id="{E1ED4ACF-2D82-46F2-A8E9-23963AA34E86}" type="datetime1">
               <a:rPr lang="en-US" smtClean="0"/>
-              <a:t>6/5/2017</a:t>
+              <a:t>6/6/2017</a:t>
             </a:fld>
             <a:endParaRPr lang="en-US"/>
           </a:p>
@@ -7750,7 +7750,7 @@
           <a:p>
             <a:fld id="{AE374B5B-21A0-4192-BF4C-38187F1A68D8}" type="datetime1">
               <a:rPr lang="en-US" smtClean="0"/>
-              <a:t>6/5/2017</a:t>
+              <a:t>6/6/2017</a:t>
             </a:fld>
             <a:endParaRPr lang="en-US"/>
           </a:p>
@@ -10090,7 +10090,7 @@
           <a:p>
             <a:fld id="{33B5CF7C-B333-48E1-A4A6-83A3C8B73AC0}" type="datetime1">
               <a:rPr lang="en-US" smtClean="0"/>
-              <a:t>6/5/2017</a:t>
+              <a:t>6/6/2017</a:t>
             </a:fld>
             <a:endParaRPr lang="en-US"/>
           </a:p>
@@ -10542,7 +10542,7 @@
           <a:p>
             <a:fld id="{AE320762-5CBF-4210-AB54-376B091119F8}" type="datetime1">
               <a:rPr lang="en-US" smtClean="0"/>
-              <a:t>6/5/2017</a:t>
+              <a:t>6/6/2017</a:t>
             </a:fld>
             <a:endParaRPr lang="en-US"/>
           </a:p>
@@ -10672,7 +10672,7 @@
           <a:p>
             <a:fld id="{7F0DB371-BF5F-4058-A212-1A908E4D2674}" type="datetime1">
               <a:rPr lang="en-US" smtClean="0"/>
-              <a:t>6/5/2017</a:t>
+              <a:t>6/6/2017</a:t>
             </a:fld>
             <a:endParaRPr lang="en-US"/>
           </a:p>
@@ -12602,7 +12602,7 @@
           <a:p>
             <a:fld id="{60A4083B-90AA-48CF-BAD5-00AA24D7F288}" type="datetime1">
               <a:rPr lang="en-US" smtClean="0"/>
-              <a:t>6/5/2017</a:t>
+              <a:t>6/6/2017</a:t>
             </a:fld>
             <a:endParaRPr lang="en-US"/>
           </a:p>
@@ -14849,7 +14849,7 @@
           <a:p>
             <a:fld id="{F5BAF629-ECA2-4CF3-B790-9D9BDED98269}" type="datetime1">
               <a:rPr lang="en-US" smtClean="0"/>
-              <a:t>6/5/2017</a:t>
+              <a:t>6/6/2017</a:t>
             </a:fld>
             <a:endParaRPr lang="en-US"/>
           </a:p>
@@ -19078,7 +19078,7 @@
           <a:p>
             <a:fld id="{B51B2453-8663-4C69-AF73-9FD7B1DEC5D0}" type="datetime1">
               <a:rPr lang="en-US" smtClean="0"/>
-              <a:t>6/5/2017</a:t>
+              <a:t>6/6/2017</a:t>
             </a:fld>
             <a:endParaRPr lang="en-US"/>
           </a:p>

</xml_diff>